<commit_message>
Thursday meeting technical slide updates
</commit_message>
<xml_diff>
--- a/doc/technical_walkthrough.pptx
+++ b/doc/technical_walkthrough.pptx
@@ -5,10 +5,10 @@
     <p:sldMasterId id="2147483664" r:id="rId4"/>
   </p:sldMasterIdLst>
   <p:notesMasterIdLst>
-    <p:notesMasterId r:id="rId17"/>
+    <p:notesMasterId r:id="rId16"/>
   </p:notesMasterIdLst>
   <p:handoutMasterIdLst>
-    <p:handoutMasterId r:id="rId18"/>
+    <p:handoutMasterId r:id="rId17"/>
   </p:handoutMasterIdLst>
   <p:sldIdLst>
     <p:sldId id="294" r:id="rId5"/>
@@ -16,13 +16,12 @@
     <p:sldId id="295" r:id="rId7"/>
     <p:sldId id="312" r:id="rId8"/>
     <p:sldId id="297" r:id="rId9"/>
-    <p:sldId id="307" r:id="rId10"/>
-    <p:sldId id="310" r:id="rId11"/>
-    <p:sldId id="308" r:id="rId12"/>
-    <p:sldId id="304" r:id="rId13"/>
+    <p:sldId id="304" r:id="rId10"/>
+    <p:sldId id="307" r:id="rId11"/>
+    <p:sldId id="310" r:id="rId12"/>
+    <p:sldId id="308" r:id="rId13"/>
     <p:sldId id="309" r:id="rId14"/>
     <p:sldId id="296" r:id="rId15"/>
-    <p:sldId id="301" r:id="rId16"/>
   </p:sldIdLst>
   <p:sldSz cx="9144000" cy="5143500" type="screen16x9"/>
   <p:notesSz cx="7010400" cy="9296400"/>
@@ -1136,7 +1135,10 @@
           <a:bodyPr/>
           <a:lstStyle/>
           <a:p>
-            <a:endParaRPr lang="en-US" dirty="0"/>
+            <a:r>
+              <a:rPr lang="en-US" dirty="0"/>
+              <a:t>Validation: allows for unbiased evaluation of a model fit on the training data set while tuning the hyperparameters (the number of hidden units in a neural network)</a:t>
+            </a:r>
           </a:p>
         </p:txBody>
       </p:sp>
@@ -1166,7 +1168,7 @@
     </p:spTree>
     <p:extLst>
       <p:ext uri="{BB962C8B-B14F-4D97-AF65-F5344CB8AC3E}">
-        <p14:creationId xmlns:p14="http://schemas.microsoft.com/office/powerpoint/2010/main" val="3831815249"/>
+        <p14:creationId xmlns:p14="http://schemas.microsoft.com/office/powerpoint/2010/main" val="3124520235"/>
       </p:ext>
     </p:extLst>
   </p:cSld>
@@ -1250,7 +1252,7 @@
     </p:spTree>
     <p:extLst>
       <p:ext uri="{BB962C8B-B14F-4D97-AF65-F5344CB8AC3E}">
-        <p14:creationId xmlns:p14="http://schemas.microsoft.com/office/powerpoint/2010/main" val="2626035200"/>
+        <p14:creationId xmlns:p14="http://schemas.microsoft.com/office/powerpoint/2010/main" val="3831815249"/>
       </p:ext>
     </p:extLst>
   </p:cSld>
@@ -1334,7 +1336,7 @@
     </p:spTree>
     <p:extLst>
       <p:ext uri="{BB962C8B-B14F-4D97-AF65-F5344CB8AC3E}">
-        <p14:creationId xmlns:p14="http://schemas.microsoft.com/office/powerpoint/2010/main" val="2348178394"/>
+        <p14:creationId xmlns:p14="http://schemas.microsoft.com/office/powerpoint/2010/main" val="2626035200"/>
       </p:ext>
     </p:extLst>
   </p:cSld>
@@ -1388,10 +1390,7 @@
           <a:bodyPr/>
           <a:lstStyle/>
           <a:p>
-            <a:r>
-              <a:rPr lang="en-US" dirty="0"/>
-              <a:t>Validation: allows for unbiased evaluation of a model fit on the training data set while tuning the hyperparameters (the number of hidden units in a neural network)</a:t>
-            </a:r>
+            <a:endParaRPr lang="en-US" dirty="0"/>
           </a:p>
         </p:txBody>
       </p:sp>
@@ -1421,7 +1420,7 @@
     </p:spTree>
     <p:extLst>
       <p:ext uri="{BB962C8B-B14F-4D97-AF65-F5344CB8AC3E}">
-        <p14:creationId xmlns:p14="http://schemas.microsoft.com/office/powerpoint/2010/main" val="3124520235"/>
+        <p14:creationId xmlns:p14="http://schemas.microsoft.com/office/powerpoint/2010/main" val="2348178394"/>
       </p:ext>
     </p:extLst>
   </p:cSld>
@@ -4988,227 +4987,6 @@
 </p:sld>
 </file>
 
-<file path=ppt/slides/slide12.xml><?xml version="1.0" encoding="utf-8"?>
-<p:sld xmlns:a="http://schemas.openxmlformats.org/drawingml/2006/main" xmlns:r="http://schemas.openxmlformats.org/officeDocument/2006/relationships" xmlns:p="http://schemas.openxmlformats.org/presentationml/2006/main">
-  <p:cSld>
-    <p:spTree>
-      <p:nvGrpSpPr>
-        <p:cNvPr id="1" name=""/>
-        <p:cNvGrpSpPr/>
-        <p:nvPr/>
-      </p:nvGrpSpPr>
-      <p:grpSpPr>
-        <a:xfrm>
-          <a:off x="0" y="0"/>
-          <a:ext cx="0" cy="0"/>
-          <a:chOff x="0" y="0"/>
-          <a:chExt cx="0" cy="0"/>
-        </a:xfrm>
-      </p:grpSpPr>
-      <p:sp>
-        <p:nvSpPr>
-          <p:cNvPr id="2" name="Slide Number Placeholder 1">
-            <a:extLst>
-              <a:ext uri="{FF2B5EF4-FFF2-40B4-BE49-F238E27FC236}">
-                <a16:creationId xmlns:a16="http://schemas.microsoft.com/office/drawing/2014/main" id="{C3876B54-91C7-4CA0-981B-0280BE7EB7E4}"/>
-              </a:ext>
-            </a:extLst>
-          </p:cNvPr>
-          <p:cNvSpPr>
-            <a:spLocks noGrp="1"/>
-          </p:cNvSpPr>
-          <p:nvPr>
-            <p:ph type="sldNum" sz="quarter" idx="4"/>
-          </p:nvPr>
-        </p:nvSpPr>
-        <p:spPr/>
-        <p:txBody>
-          <a:bodyPr/>
-          <a:lstStyle/>
-          <a:p>
-            <a:r>
-              <a:rPr lang="en-US"/>
-              <a:t>Presented by DHS | </a:t>
-            </a:r>
-            <a:fld id="{8997B844-ACA2-A34A-B180-F01E98B0D70C}" type="slidenum">
-              <a:rPr lang="en-US" smtClean="0"/>
-              <a:pPr/>
-              <a:t>12</a:t>
-            </a:fld>
-            <a:endParaRPr lang="en-US" dirty="0"/>
-          </a:p>
-        </p:txBody>
-      </p:sp>
-      <p:sp>
-        <p:nvSpPr>
-          <p:cNvPr id="3" name="Title 2">
-            <a:extLst>
-              <a:ext uri="{FF2B5EF4-FFF2-40B4-BE49-F238E27FC236}">
-                <a16:creationId xmlns:a16="http://schemas.microsoft.com/office/drawing/2014/main" id="{9D6973F2-923D-4F4F-8A40-6D33454876B0}"/>
-              </a:ext>
-            </a:extLst>
-          </p:cNvPr>
-          <p:cNvSpPr>
-            <a:spLocks noGrp="1"/>
-          </p:cNvSpPr>
-          <p:nvPr>
-            <p:ph type="title"/>
-          </p:nvPr>
-        </p:nvSpPr>
-        <p:spPr/>
-        <p:txBody>
-          <a:bodyPr/>
-          <a:lstStyle/>
-          <a:p>
-            <a:r>
-              <a:rPr lang="en-US" dirty="0">
-                <a:solidFill>
-                  <a:schemeClr val="bg1"/>
-                </a:solidFill>
-              </a:rPr>
-              <a:t>Next Steps</a:t>
-            </a:r>
-          </a:p>
-        </p:txBody>
-      </p:sp>
-      <p:sp>
-        <p:nvSpPr>
-          <p:cNvPr id="6" name="TextBox 5">
-            <a:extLst>
-              <a:ext uri="{FF2B5EF4-FFF2-40B4-BE49-F238E27FC236}">
-                <a16:creationId xmlns:a16="http://schemas.microsoft.com/office/drawing/2014/main" id="{06A3DF41-1875-CFCE-B358-C57008E730C8}"/>
-              </a:ext>
-            </a:extLst>
-          </p:cNvPr>
-          <p:cNvSpPr txBox="1"/>
-          <p:nvPr/>
-        </p:nvSpPr>
-        <p:spPr>
-          <a:xfrm>
-            <a:off x="1030472" y="1164441"/>
-            <a:ext cx="8377518" cy="2814617"/>
-          </a:xfrm>
-          <a:prstGeom prst="rect">
-            <a:avLst/>
-          </a:prstGeom>
-          <a:noFill/>
-        </p:spPr>
-        <p:txBody>
-          <a:bodyPr wrap="square" rtlCol="0">
-            <a:spAutoFit/>
-          </a:bodyPr>
-          <a:lstStyle/>
-          <a:p>
-            <a:pPr marL="457200" indent="-457200">
-              <a:lnSpc>
-                <a:spcPct val="150000"/>
-              </a:lnSpc>
-              <a:buFont typeface="+mj-lt"/>
-              <a:buAutoNum type="arabicPeriod"/>
-            </a:pPr>
-            <a:r>
-              <a:rPr lang="en-US" sz="2000" dirty="0">
-                <a:latin typeface="Calibri" panose="020F0502020204030204" pitchFamily="34" charset="0"/>
-                <a:cs typeface="Calibri" panose="020F0502020204030204" pitchFamily="34" charset="0"/>
-              </a:rPr>
-              <a:t>Fine-tune training data, neural network architecture &amp; parameters</a:t>
-            </a:r>
-          </a:p>
-          <a:p>
-            <a:pPr marL="457200" indent="-457200">
-              <a:lnSpc>
-                <a:spcPct val="150000"/>
-              </a:lnSpc>
-              <a:buFont typeface="+mj-lt"/>
-              <a:buAutoNum type="arabicPeriod"/>
-            </a:pPr>
-            <a:r>
-              <a:rPr lang="en-US" sz="2000" dirty="0">
-                <a:latin typeface="Calibri" panose="020F0502020204030204" pitchFamily="34" charset="0"/>
-                <a:cs typeface="Calibri" panose="020F0502020204030204" pitchFamily="34" charset="0"/>
-              </a:rPr>
-              <a:t>Further guidance on scoring from GAO</a:t>
-            </a:r>
-          </a:p>
-          <a:p>
-            <a:pPr marL="914400" lvl="1" indent="-457200">
-              <a:lnSpc>
-                <a:spcPct val="150000"/>
-              </a:lnSpc>
-              <a:buFont typeface="Arial" panose="020B0604020202020204" pitchFamily="34" charset="0"/>
-              <a:buChar char="•"/>
-            </a:pPr>
-            <a:r>
-              <a:rPr lang="en-US" sz="2000" dirty="0">
-                <a:latin typeface="Calibri" panose="020F0502020204030204" pitchFamily="34" charset="0"/>
-                <a:cs typeface="Calibri" panose="020F0502020204030204" pitchFamily="34" charset="0"/>
-              </a:rPr>
-              <a:t>Possibility of rules instituted to handle edge cases?</a:t>
-            </a:r>
-          </a:p>
-          <a:p>
-            <a:pPr marL="457200" indent="-457200">
-              <a:lnSpc>
-                <a:spcPct val="150000"/>
-              </a:lnSpc>
-              <a:buFont typeface="+mj-lt"/>
-              <a:buAutoNum type="arabicPeriod"/>
-            </a:pPr>
-            <a:r>
-              <a:rPr lang="en-US" sz="2000" dirty="0">
-                <a:latin typeface="Calibri" panose="020F0502020204030204" pitchFamily="34" charset="0"/>
-                <a:cs typeface="Calibri" panose="020F0502020204030204" pitchFamily="34" charset="0"/>
-              </a:rPr>
-              <a:t>Collaboration on stand-up service with GAO</a:t>
-            </a:r>
-          </a:p>
-          <a:p>
-            <a:pPr marL="914400" lvl="1" indent="-457200">
-              <a:lnSpc>
-                <a:spcPct val="150000"/>
-              </a:lnSpc>
-              <a:buFont typeface="Arial" panose="020B0604020202020204" pitchFamily="34" charset="0"/>
-              <a:buChar char="•"/>
-            </a:pPr>
-            <a:r>
-              <a:rPr lang="en-US" sz="2000" dirty="0">
-                <a:latin typeface="Calibri" panose="020F0502020204030204" pitchFamily="34" charset="0"/>
-                <a:cs typeface="Calibri" panose="020F0502020204030204" pitchFamily="34" charset="0"/>
-              </a:rPr>
-              <a:t>Enhance guidance for GAO framework (AI principles)</a:t>
-            </a:r>
-          </a:p>
-          <a:p>
-            <a:pPr marL="457200" indent="-457200">
-              <a:lnSpc>
-                <a:spcPct val="150000"/>
-              </a:lnSpc>
-              <a:buFont typeface="+mj-lt"/>
-              <a:buAutoNum type="arabicPeriod"/>
-            </a:pPr>
-            <a:r>
-              <a:rPr lang="en-US" sz="2000" dirty="0">
-                <a:latin typeface="Calibri" panose="020F0502020204030204" pitchFamily="34" charset="0"/>
-                <a:cs typeface="Calibri" panose="020F0502020204030204" pitchFamily="34" charset="0"/>
-              </a:rPr>
-              <a:t>Adapt to NIST AI Risk Framework</a:t>
-            </a:r>
-          </a:p>
-        </p:txBody>
-      </p:sp>
-    </p:spTree>
-    <p:extLst>
-      <p:ext uri="{BB962C8B-B14F-4D97-AF65-F5344CB8AC3E}">
-        <p14:creationId xmlns:p14="http://schemas.microsoft.com/office/powerpoint/2010/main" val="885527319"/>
-      </p:ext>
-    </p:extLst>
-  </p:cSld>
-  <p:clrMapOvr>
-    <a:masterClrMapping/>
-  </p:clrMapOvr>
-</p:sld>
-</file>
-
 <file path=ppt/slides/slide2.xml><?xml version="1.0" encoding="utf-8"?>
 <p:sld xmlns:a="http://schemas.openxmlformats.org/drawingml/2006/main" xmlns:r="http://schemas.openxmlformats.org/officeDocument/2006/relationships" xmlns:p="http://schemas.openxmlformats.org/presentationml/2006/main">
   <p:cSld>
@@ -5307,7 +5085,7 @@
         <p:spPr>
           <a:xfrm>
             <a:off x="71376" y="870384"/>
-            <a:ext cx="8906369" cy="3365024"/>
+            <a:ext cx="8906369" cy="2957861"/>
           </a:xfrm>
           <a:prstGeom prst="rect">
             <a:avLst/>
@@ -5337,23 +5115,10 @@
               </a:rPr>
               <a:t>What is the proposed solution?</a:t>
             </a:r>
-            <a:r>
-              <a:rPr lang="en-US" dirty="0">
-                <a:solidFill>
-                  <a:srgbClr val="0070C0"/>
-                </a:solidFill>
-                <a:latin typeface="Calibri" panose="020F0502020204030204" pitchFamily="34" charset="0"/>
-                <a:cs typeface="Calibri" panose="020F0502020204030204" pitchFamily="34" charset="0"/>
-              </a:rPr>
-              <a:t> </a:t>
-            </a:r>
-            <a:r>
-              <a:rPr lang="en-US" dirty="0">
-                <a:latin typeface="Calibri" panose="020F0502020204030204" pitchFamily="34" charset="0"/>
-                <a:cs typeface="Calibri" panose="020F0502020204030204" pitchFamily="34" charset="0"/>
-              </a:rPr>
-              <a:t>A tool that:</a:t>
-            </a:r>
+            <a:endParaRPr lang="en-US" dirty="0">
+              <a:latin typeface="Calibri" panose="020F0502020204030204" pitchFamily="34" charset="0"/>
+              <a:cs typeface="Calibri" panose="020F0502020204030204" pitchFamily="34" charset="0"/>
+            </a:endParaRPr>
           </a:p>
           <a:p>
             <a:pPr marL="800100" lvl="1" indent="-342900">
@@ -5368,7 +5133,7 @@
                 <a:latin typeface="Calibri" panose="020F0502020204030204" pitchFamily="34" charset="0"/>
                 <a:cs typeface="Calibri" panose="020F0502020204030204" pitchFamily="34" charset="0"/>
               </a:rPr>
-              <a:t>Allows AI/ML use-case owners to submit self-defined GAO principles scores</a:t>
+              <a:t>Submission of self-defined GAO framework scores</a:t>
             </a:r>
           </a:p>
           <a:p>
@@ -5384,7 +5149,7 @@
                 <a:latin typeface="Calibri" panose="020F0502020204030204" pitchFamily="34" charset="0"/>
                 <a:cs typeface="Calibri" panose="020F0502020204030204" pitchFamily="34" charset="0"/>
               </a:rPr>
-              <a:t>Computes an overall compliance score for an AI/ML use-case</a:t>
+              <a:t>Computation of overall compliance score for AI/ML use-cases</a:t>
             </a:r>
             <a:endParaRPr lang="en-US" b="1" dirty="0">
               <a:latin typeface="Calibri" panose="020F0502020204030204" pitchFamily="34" charset="0"/>
@@ -5440,22 +5205,6 @@
                 <a:cs typeface="Calibri" panose="020F0502020204030204" pitchFamily="34" charset="0"/>
               </a:rPr>
               <a:t>Streamline the scoring and compliance process for use-case owners</a:t>
-            </a:r>
-          </a:p>
-          <a:p>
-            <a:pPr marL="800100" lvl="1" indent="-342900">
-              <a:lnSpc>
-                <a:spcPct val="150000"/>
-              </a:lnSpc>
-              <a:buFont typeface="+mj-lt"/>
-              <a:buAutoNum type="arabicPeriod"/>
-            </a:pPr>
-            <a:r>
-              <a:rPr lang="en-US" dirty="0">
-                <a:latin typeface="Calibri" panose="020F0502020204030204" pitchFamily="34" charset="0"/>
-                <a:cs typeface="Calibri" panose="020F0502020204030204" pitchFamily="34" charset="0"/>
-              </a:rPr>
-              <a:t>Surfaces issues with the GAO AI Accountability Framework</a:t>
             </a:r>
           </a:p>
           <a:p>
@@ -5926,105 +5675,6 @@
           </a:p>
         </p:txBody>
       </p:sp>
-      <p:cxnSp>
-        <p:nvCxnSpPr>
-          <p:cNvPr id="7" name="Straight Arrow Connector 6">
-            <a:extLst>
-              <a:ext uri="{FF2B5EF4-FFF2-40B4-BE49-F238E27FC236}">
-                <a16:creationId xmlns:a16="http://schemas.microsoft.com/office/drawing/2014/main" id="{07A1513A-EB20-4D2F-AF80-0F5A9D30D53E}"/>
-              </a:ext>
-            </a:extLst>
-          </p:cNvPr>
-          <p:cNvCxnSpPr>
-            <a:cxnSpLocks/>
-          </p:cNvCxnSpPr>
-          <p:nvPr/>
-        </p:nvCxnSpPr>
-        <p:spPr>
-          <a:xfrm flipH="1">
-            <a:off x="7063052" y="1519171"/>
-            <a:ext cx="555813" cy="409433"/>
-          </a:xfrm>
-          <a:prstGeom prst="straightConnector1">
-            <a:avLst/>
-          </a:prstGeom>
-          <a:ln>
-            <a:solidFill>
-              <a:srgbClr val="0070C0"/>
-            </a:solidFill>
-            <a:tailEnd type="triangle"/>
-          </a:ln>
-        </p:spPr>
-        <p:style>
-          <a:lnRef idx="2">
-            <a:schemeClr val="accent1"/>
-          </a:lnRef>
-          <a:fillRef idx="0">
-            <a:schemeClr val="accent1"/>
-          </a:fillRef>
-          <a:effectRef idx="1">
-            <a:schemeClr val="accent1"/>
-          </a:effectRef>
-          <a:fontRef idx="minor">
-            <a:schemeClr val="tx1"/>
-          </a:fontRef>
-        </p:style>
-      </p:cxnSp>
-      <p:sp>
-        <p:nvSpPr>
-          <p:cNvPr id="9" name="TextBox 8">
-            <a:extLst>
-              <a:ext uri="{FF2B5EF4-FFF2-40B4-BE49-F238E27FC236}">
-                <a16:creationId xmlns:a16="http://schemas.microsoft.com/office/drawing/2014/main" id="{3460F285-A1D7-4ABD-BAC6-E4F2B28BCD13}"/>
-              </a:ext>
-            </a:extLst>
-          </p:cNvPr>
-          <p:cNvSpPr txBox="1"/>
-          <p:nvPr/>
-        </p:nvSpPr>
-        <p:spPr>
-          <a:xfrm>
-            <a:off x="7469875" y="1042118"/>
-            <a:ext cx="1477188" cy="954107"/>
-          </a:xfrm>
-          <a:prstGeom prst="rect">
-            <a:avLst/>
-          </a:prstGeom>
-          <a:noFill/>
-        </p:spPr>
-        <p:txBody>
-          <a:bodyPr wrap="square" rtlCol="0">
-            <a:spAutoFit/>
-          </a:bodyPr>
-          <a:lstStyle/>
-          <a:p>
-            <a:pPr algn="ctr"/>
-            <a:r>
-              <a:rPr lang="en-US" sz="1400" dirty="0">
-                <a:solidFill>
-                  <a:srgbClr val="0070C0"/>
-                </a:solidFill>
-                <a:latin typeface="Calibri" panose="020F0502020204030204" pitchFamily="34" charset="0"/>
-                <a:cs typeface="Calibri" panose="020F0502020204030204" pitchFamily="34" charset="0"/>
-              </a:rPr>
-              <a:t>These need to be broken down </a:t>
-            </a:r>
-          </a:p>
-          <a:p>
-            <a:pPr algn="ctr"/>
-            <a:r>
-              <a:rPr lang="en-US" sz="1400" dirty="0">
-                <a:solidFill>
-                  <a:srgbClr val="0070C0"/>
-                </a:solidFill>
-                <a:latin typeface="Calibri" panose="020F0502020204030204" pitchFamily="34" charset="0"/>
-                <a:cs typeface="Calibri" panose="020F0502020204030204" pitchFamily="34" charset="0"/>
-              </a:rPr>
-              <a:t>into deeper subsections!</a:t>
-            </a:r>
-          </a:p>
-        </p:txBody>
-      </p:sp>
       <p:sp>
         <p:nvSpPr>
           <p:cNvPr id="10" name="Rectangle: Rounded Corners 9">
@@ -6205,105 +5855,6 @@
                 <a:cs typeface="Calibri" panose="020F0502020204030204" pitchFamily="34" charset="0"/>
               </a:rPr>
               <a:t>1.1.3</a:t>
-            </a:r>
-          </a:p>
-        </p:txBody>
-      </p:sp>
-      <p:cxnSp>
-        <p:nvCxnSpPr>
-          <p:cNvPr id="6" name="Straight Arrow Connector 5">
-            <a:extLst>
-              <a:ext uri="{FF2B5EF4-FFF2-40B4-BE49-F238E27FC236}">
-                <a16:creationId xmlns:a16="http://schemas.microsoft.com/office/drawing/2014/main" id="{5D39965E-09D8-EDFA-8BA1-9346EFA15873}"/>
-              </a:ext>
-            </a:extLst>
-          </p:cNvPr>
-          <p:cNvCxnSpPr>
-            <a:cxnSpLocks/>
-          </p:cNvCxnSpPr>
-          <p:nvPr/>
-        </p:nvCxnSpPr>
-        <p:spPr>
-          <a:xfrm>
-            <a:off x="1107605" y="2657832"/>
-            <a:ext cx="602783" cy="287359"/>
-          </a:xfrm>
-          <a:prstGeom prst="straightConnector1">
-            <a:avLst/>
-          </a:prstGeom>
-          <a:ln>
-            <a:solidFill>
-              <a:srgbClr val="0070C0"/>
-            </a:solidFill>
-            <a:tailEnd type="triangle"/>
-          </a:ln>
-        </p:spPr>
-        <p:style>
-          <a:lnRef idx="2">
-            <a:schemeClr val="accent1"/>
-          </a:lnRef>
-          <a:fillRef idx="0">
-            <a:schemeClr val="accent1"/>
-          </a:fillRef>
-          <a:effectRef idx="1">
-            <a:schemeClr val="accent1"/>
-          </a:effectRef>
-          <a:fontRef idx="minor">
-            <a:schemeClr val="tx1"/>
-          </a:fontRef>
-        </p:style>
-      </p:cxnSp>
-      <p:sp>
-        <p:nvSpPr>
-          <p:cNvPr id="17" name="TextBox 16">
-            <a:extLst>
-              <a:ext uri="{FF2B5EF4-FFF2-40B4-BE49-F238E27FC236}">
-                <a16:creationId xmlns:a16="http://schemas.microsoft.com/office/drawing/2014/main" id="{22B779BB-4E34-79E6-1668-8AEECD4806BB}"/>
-              </a:ext>
-            </a:extLst>
-          </p:cNvPr>
-          <p:cNvSpPr txBox="1"/>
-          <p:nvPr/>
-        </p:nvSpPr>
-        <p:spPr>
-          <a:xfrm>
-            <a:off x="187944" y="1057394"/>
-            <a:ext cx="1477188" cy="1600438"/>
-          </a:xfrm>
-          <a:prstGeom prst="rect">
-            <a:avLst/>
-          </a:prstGeom>
-          <a:noFill/>
-        </p:spPr>
-        <p:txBody>
-          <a:bodyPr wrap="square" rtlCol="0">
-            <a:spAutoFit/>
-          </a:bodyPr>
-          <a:lstStyle/>
-          <a:p>
-            <a:pPr algn="ctr"/>
-            <a:r>
-              <a:rPr lang="en-US" sz="1400" dirty="0">
-                <a:solidFill>
-                  <a:srgbClr val="0070C0"/>
-                </a:solidFill>
-                <a:latin typeface="Calibri" panose="020F0502020204030204" pitchFamily="34" charset="0"/>
-                <a:cs typeface="Calibri" panose="020F0502020204030204" pitchFamily="34" charset="0"/>
-              </a:rPr>
-              <a:t>Who is responsible for answering? </a:t>
-            </a:r>
-          </a:p>
-          <a:p>
-            <a:pPr algn="ctr"/>
-            <a:r>
-              <a:rPr lang="en-US" sz="1400" dirty="0">
-                <a:solidFill>
-                  <a:srgbClr val="0070C0"/>
-                </a:solidFill>
-                <a:latin typeface="Calibri" panose="020F0502020204030204" pitchFamily="34" charset="0"/>
-                <a:cs typeface="Calibri" panose="020F0502020204030204" pitchFamily="34" charset="0"/>
-              </a:rPr>
-              <a:t>How would the necessary perspectives be gathered?</a:t>
             </a:r>
           </a:p>
         </p:txBody>
@@ -14640,6 +14191,222 @@
               <a:rPr lang="en-US" smtClean="0"/>
               <a:pPr/>
               <a:t>6</a:t>
+            </a:fld>
+            <a:endParaRPr lang="en-US" dirty="0"/>
+          </a:p>
+        </p:txBody>
+      </p:sp>
+      <p:sp>
+        <p:nvSpPr>
+          <p:cNvPr id="3" name="Title 2">
+            <a:extLst>
+              <a:ext uri="{FF2B5EF4-FFF2-40B4-BE49-F238E27FC236}">
+                <a16:creationId xmlns:a16="http://schemas.microsoft.com/office/drawing/2014/main" id="{9D6973F2-923D-4F4F-8A40-6D33454876B0}"/>
+              </a:ext>
+            </a:extLst>
+          </p:cNvPr>
+          <p:cNvSpPr>
+            <a:spLocks noGrp="1"/>
+          </p:cNvSpPr>
+          <p:nvPr>
+            <p:ph type="title"/>
+          </p:nvPr>
+        </p:nvSpPr>
+        <p:spPr/>
+        <p:txBody>
+          <a:bodyPr/>
+          <a:lstStyle/>
+          <a:p>
+            <a:r>
+              <a:rPr lang="en-US" dirty="0">
+                <a:solidFill>
+                  <a:schemeClr val="bg1"/>
+                </a:solidFill>
+              </a:rPr>
+              <a:t>Model Performance (Accuracy)</a:t>
+            </a:r>
+          </a:p>
+        </p:txBody>
+      </p:sp>
+      <p:pic>
+        <p:nvPicPr>
+          <p:cNvPr id="6" name="Picture 5" descr="A graph with blue and orange lines&#10;&#10;Description automatically generated">
+            <a:extLst>
+              <a:ext uri="{FF2B5EF4-FFF2-40B4-BE49-F238E27FC236}">
+                <a16:creationId xmlns:a16="http://schemas.microsoft.com/office/drawing/2014/main" id="{62DEF4AD-AFF4-81C1-6629-2A64A04B8B4C}"/>
+              </a:ext>
+            </a:extLst>
+          </p:cNvPr>
+          <p:cNvPicPr>
+            <a:picLocks noChangeAspect="1"/>
+          </p:cNvPicPr>
+          <p:nvPr/>
+        </p:nvPicPr>
+        <p:blipFill>
+          <a:blip r:embed="rId3"/>
+          <a:stretch>
+            <a:fillRect/>
+          </a:stretch>
+        </p:blipFill>
+        <p:spPr>
+          <a:xfrm>
+            <a:off x="590468" y="2857382"/>
+            <a:ext cx="2994901" cy="1821073"/>
+          </a:xfrm>
+          <a:prstGeom prst="rect">
+            <a:avLst/>
+          </a:prstGeom>
+        </p:spPr>
+      </p:pic>
+      <p:pic>
+        <p:nvPicPr>
+          <p:cNvPr id="11" name="Picture 10" descr="A graph with blue lines and orange lines&#10;&#10;Description automatically generated">
+            <a:extLst>
+              <a:ext uri="{FF2B5EF4-FFF2-40B4-BE49-F238E27FC236}">
+                <a16:creationId xmlns:a16="http://schemas.microsoft.com/office/drawing/2014/main" id="{65F67A0E-C35E-3AF9-EFC5-387A3F9F907E}"/>
+              </a:ext>
+            </a:extLst>
+          </p:cNvPr>
+          <p:cNvPicPr>
+            <a:picLocks noChangeAspect="1"/>
+          </p:cNvPicPr>
+          <p:nvPr/>
+        </p:nvPicPr>
+        <p:blipFill>
+          <a:blip r:embed="rId4"/>
+          <a:stretch>
+            <a:fillRect/>
+          </a:stretch>
+        </p:blipFill>
+        <p:spPr>
+          <a:xfrm>
+            <a:off x="4877306" y="2817353"/>
+            <a:ext cx="3021604" cy="1844422"/>
+          </a:xfrm>
+          <a:prstGeom prst="rect">
+            <a:avLst/>
+          </a:prstGeom>
+        </p:spPr>
+      </p:pic>
+      <p:pic>
+        <p:nvPicPr>
+          <p:cNvPr id="13" name="Picture 12" descr="A graph with blue and orange lines&#10;&#10;Description automatically generated">
+            <a:extLst>
+              <a:ext uri="{FF2B5EF4-FFF2-40B4-BE49-F238E27FC236}">
+                <a16:creationId xmlns:a16="http://schemas.microsoft.com/office/drawing/2014/main" id="{8AB8B9A6-B0A1-3353-FC85-01398E93AA83}"/>
+              </a:ext>
+            </a:extLst>
+          </p:cNvPr>
+          <p:cNvPicPr>
+            <a:picLocks noChangeAspect="1"/>
+          </p:cNvPicPr>
+          <p:nvPr/>
+        </p:nvPicPr>
+        <p:blipFill>
+          <a:blip r:embed="rId5"/>
+          <a:stretch>
+            <a:fillRect/>
+          </a:stretch>
+        </p:blipFill>
+        <p:spPr>
+          <a:xfrm>
+            <a:off x="590467" y="715057"/>
+            <a:ext cx="2994901" cy="2142326"/>
+          </a:xfrm>
+          <a:prstGeom prst="rect">
+            <a:avLst/>
+          </a:prstGeom>
+        </p:spPr>
+      </p:pic>
+      <p:pic>
+        <p:nvPicPr>
+          <p:cNvPr id="15" name="Picture 14" descr="A graph with blue and orange lines&#10;&#10;Description automatically generated">
+            <a:extLst>
+              <a:ext uri="{FF2B5EF4-FFF2-40B4-BE49-F238E27FC236}">
+                <a16:creationId xmlns:a16="http://schemas.microsoft.com/office/drawing/2014/main" id="{5BB9DD5D-A4F9-F662-FF40-A40C9457B778}"/>
+              </a:ext>
+            </a:extLst>
+          </p:cNvPr>
+          <p:cNvPicPr>
+            <a:picLocks noChangeAspect="1"/>
+          </p:cNvPicPr>
+          <p:nvPr/>
+        </p:nvPicPr>
+        <p:blipFill>
+          <a:blip r:embed="rId6"/>
+          <a:stretch>
+            <a:fillRect/>
+          </a:stretch>
+        </p:blipFill>
+        <p:spPr>
+          <a:xfrm>
+            <a:off x="4883865" y="715057"/>
+            <a:ext cx="3021604" cy="2094755"/>
+          </a:xfrm>
+          <a:prstGeom prst="rect">
+            <a:avLst/>
+          </a:prstGeom>
+        </p:spPr>
+      </p:pic>
+    </p:spTree>
+    <p:extLst>
+      <p:ext uri="{BB962C8B-B14F-4D97-AF65-F5344CB8AC3E}">
+        <p14:creationId xmlns:p14="http://schemas.microsoft.com/office/powerpoint/2010/main" val="2703077859"/>
+      </p:ext>
+    </p:extLst>
+  </p:cSld>
+  <p:clrMapOvr>
+    <a:masterClrMapping/>
+  </p:clrMapOvr>
+</p:sld>
+</file>
+
+<file path=ppt/slides/slide7.xml><?xml version="1.0" encoding="utf-8"?>
+<p:sld xmlns:a="http://schemas.openxmlformats.org/drawingml/2006/main" xmlns:r="http://schemas.openxmlformats.org/officeDocument/2006/relationships" xmlns:p="http://schemas.openxmlformats.org/presentationml/2006/main">
+  <p:cSld>
+    <p:spTree>
+      <p:nvGrpSpPr>
+        <p:cNvPr id="1" name=""/>
+        <p:cNvGrpSpPr/>
+        <p:nvPr/>
+      </p:nvGrpSpPr>
+      <p:grpSpPr>
+        <a:xfrm>
+          <a:off x="0" y="0"/>
+          <a:ext cx="0" cy="0"/>
+          <a:chOff x="0" y="0"/>
+          <a:chExt cx="0" cy="0"/>
+        </a:xfrm>
+      </p:grpSpPr>
+      <p:sp>
+        <p:nvSpPr>
+          <p:cNvPr id="2" name="Slide Number Placeholder 1">
+            <a:extLst>
+              <a:ext uri="{FF2B5EF4-FFF2-40B4-BE49-F238E27FC236}">
+                <a16:creationId xmlns:a16="http://schemas.microsoft.com/office/drawing/2014/main" id="{C3876B54-91C7-4CA0-981B-0280BE7EB7E4}"/>
+              </a:ext>
+            </a:extLst>
+          </p:cNvPr>
+          <p:cNvSpPr>
+            <a:spLocks noGrp="1"/>
+          </p:cNvSpPr>
+          <p:nvPr>
+            <p:ph type="sldNum" sz="quarter" idx="4"/>
+          </p:nvPr>
+        </p:nvSpPr>
+        <p:spPr/>
+        <p:txBody>
+          <a:bodyPr/>
+          <a:lstStyle/>
+          <a:p>
+            <a:r>
+              <a:rPr lang="en-US"/>
+              <a:t>Presented by DHS | </a:t>
+            </a:r>
+            <a:fld id="{8997B844-ACA2-A34A-B180-F01E98B0D70C}" type="slidenum">
+              <a:rPr lang="en-US" smtClean="0"/>
+              <a:pPr/>
+              <a:t>7</a:t>
             </a:fld>
             <a:endParaRPr lang="en-US" dirty="0"/>
           </a:p>
@@ -15104,7 +14871,7 @@
 </p:sld>
 </file>
 
-<file path=ppt/slides/slide7.xml><?xml version="1.0" encoding="utf-8"?>
+<file path=ppt/slides/slide8.xml><?xml version="1.0" encoding="utf-8"?>
 <p:sld xmlns:a="http://schemas.openxmlformats.org/drawingml/2006/main" xmlns:r="http://schemas.openxmlformats.org/officeDocument/2006/relationships" xmlns:p="http://schemas.openxmlformats.org/presentationml/2006/main">
   <p:cSld>
     <p:spTree>
@@ -15218,7 +14985,7 @@
             <a:fld id="{8997B844-ACA2-A34A-B180-F01E98B0D70C}" type="slidenum">
               <a:rPr lang="en-US" smtClean="0"/>
               <a:pPr/>
-              <a:t>7</a:t>
+              <a:t>8</a:t>
             </a:fld>
             <a:endParaRPr lang="en-US" dirty="0"/>
           </a:p>
@@ -15311,7 +15078,7 @@
 </p:sld>
 </file>
 
-<file path=ppt/slides/slide8.xml><?xml version="1.0" encoding="utf-8"?>
+<file path=ppt/slides/slide9.xml><?xml version="1.0" encoding="utf-8"?>
 <p:sld xmlns:a="http://schemas.openxmlformats.org/drawingml/2006/main" xmlns:r="http://schemas.openxmlformats.org/officeDocument/2006/relationships" xmlns:p="http://schemas.openxmlformats.org/presentationml/2006/main">
   <p:cSld>
     <p:spTree>
@@ -15356,7 +15123,7 @@
             <a:fld id="{8997B844-ACA2-A34A-B180-F01E98B0D70C}" type="slidenum">
               <a:rPr lang="en-US" smtClean="0"/>
               <a:pPr/>
-              <a:t>8</a:t>
+              <a:t>9</a:t>
             </a:fld>
             <a:endParaRPr lang="en-US" dirty="0"/>
           </a:p>
@@ -16063,222 +15830,6 @@
     <p:extLst>
       <p:ext uri="{BB962C8B-B14F-4D97-AF65-F5344CB8AC3E}">
         <p14:creationId xmlns:p14="http://schemas.microsoft.com/office/powerpoint/2010/main" val="3887444443"/>
-      </p:ext>
-    </p:extLst>
-  </p:cSld>
-  <p:clrMapOvr>
-    <a:masterClrMapping/>
-  </p:clrMapOvr>
-</p:sld>
-</file>
-
-<file path=ppt/slides/slide9.xml><?xml version="1.0" encoding="utf-8"?>
-<p:sld xmlns:a="http://schemas.openxmlformats.org/drawingml/2006/main" xmlns:r="http://schemas.openxmlformats.org/officeDocument/2006/relationships" xmlns:p="http://schemas.openxmlformats.org/presentationml/2006/main">
-  <p:cSld>
-    <p:spTree>
-      <p:nvGrpSpPr>
-        <p:cNvPr id="1" name=""/>
-        <p:cNvGrpSpPr/>
-        <p:nvPr/>
-      </p:nvGrpSpPr>
-      <p:grpSpPr>
-        <a:xfrm>
-          <a:off x="0" y="0"/>
-          <a:ext cx="0" cy="0"/>
-          <a:chOff x="0" y="0"/>
-          <a:chExt cx="0" cy="0"/>
-        </a:xfrm>
-      </p:grpSpPr>
-      <p:sp>
-        <p:nvSpPr>
-          <p:cNvPr id="2" name="Slide Number Placeholder 1">
-            <a:extLst>
-              <a:ext uri="{FF2B5EF4-FFF2-40B4-BE49-F238E27FC236}">
-                <a16:creationId xmlns:a16="http://schemas.microsoft.com/office/drawing/2014/main" id="{C3876B54-91C7-4CA0-981B-0280BE7EB7E4}"/>
-              </a:ext>
-            </a:extLst>
-          </p:cNvPr>
-          <p:cNvSpPr>
-            <a:spLocks noGrp="1"/>
-          </p:cNvSpPr>
-          <p:nvPr>
-            <p:ph type="sldNum" sz="quarter" idx="4"/>
-          </p:nvPr>
-        </p:nvSpPr>
-        <p:spPr/>
-        <p:txBody>
-          <a:bodyPr/>
-          <a:lstStyle/>
-          <a:p>
-            <a:r>
-              <a:rPr lang="en-US"/>
-              <a:t>Presented by DHS | </a:t>
-            </a:r>
-            <a:fld id="{8997B844-ACA2-A34A-B180-F01E98B0D70C}" type="slidenum">
-              <a:rPr lang="en-US" smtClean="0"/>
-              <a:pPr/>
-              <a:t>9</a:t>
-            </a:fld>
-            <a:endParaRPr lang="en-US" dirty="0"/>
-          </a:p>
-        </p:txBody>
-      </p:sp>
-      <p:sp>
-        <p:nvSpPr>
-          <p:cNvPr id="3" name="Title 2">
-            <a:extLst>
-              <a:ext uri="{FF2B5EF4-FFF2-40B4-BE49-F238E27FC236}">
-                <a16:creationId xmlns:a16="http://schemas.microsoft.com/office/drawing/2014/main" id="{9D6973F2-923D-4F4F-8A40-6D33454876B0}"/>
-              </a:ext>
-            </a:extLst>
-          </p:cNvPr>
-          <p:cNvSpPr>
-            <a:spLocks noGrp="1"/>
-          </p:cNvSpPr>
-          <p:nvPr>
-            <p:ph type="title"/>
-          </p:nvPr>
-        </p:nvSpPr>
-        <p:spPr/>
-        <p:txBody>
-          <a:bodyPr/>
-          <a:lstStyle/>
-          <a:p>
-            <a:r>
-              <a:rPr lang="en-US" dirty="0">
-                <a:solidFill>
-                  <a:schemeClr val="bg1"/>
-                </a:solidFill>
-              </a:rPr>
-              <a:t>Model Performance (Accuracy)</a:t>
-            </a:r>
-          </a:p>
-        </p:txBody>
-      </p:sp>
-      <p:pic>
-        <p:nvPicPr>
-          <p:cNvPr id="6" name="Picture 5" descr="A graph with blue and orange lines&#10;&#10;Description automatically generated">
-            <a:extLst>
-              <a:ext uri="{FF2B5EF4-FFF2-40B4-BE49-F238E27FC236}">
-                <a16:creationId xmlns:a16="http://schemas.microsoft.com/office/drawing/2014/main" id="{62DEF4AD-AFF4-81C1-6629-2A64A04B8B4C}"/>
-              </a:ext>
-            </a:extLst>
-          </p:cNvPr>
-          <p:cNvPicPr>
-            <a:picLocks noChangeAspect="1"/>
-          </p:cNvPicPr>
-          <p:nvPr/>
-        </p:nvPicPr>
-        <p:blipFill>
-          <a:blip r:embed="rId3"/>
-          <a:stretch>
-            <a:fillRect/>
-          </a:stretch>
-        </p:blipFill>
-        <p:spPr>
-          <a:xfrm>
-            <a:off x="590468" y="2857382"/>
-            <a:ext cx="2994901" cy="1821073"/>
-          </a:xfrm>
-          <a:prstGeom prst="rect">
-            <a:avLst/>
-          </a:prstGeom>
-        </p:spPr>
-      </p:pic>
-      <p:pic>
-        <p:nvPicPr>
-          <p:cNvPr id="11" name="Picture 10" descr="A graph with blue lines and orange lines&#10;&#10;Description automatically generated">
-            <a:extLst>
-              <a:ext uri="{FF2B5EF4-FFF2-40B4-BE49-F238E27FC236}">
-                <a16:creationId xmlns:a16="http://schemas.microsoft.com/office/drawing/2014/main" id="{65F67A0E-C35E-3AF9-EFC5-387A3F9F907E}"/>
-              </a:ext>
-            </a:extLst>
-          </p:cNvPr>
-          <p:cNvPicPr>
-            <a:picLocks noChangeAspect="1"/>
-          </p:cNvPicPr>
-          <p:nvPr/>
-        </p:nvPicPr>
-        <p:blipFill>
-          <a:blip r:embed="rId4"/>
-          <a:stretch>
-            <a:fillRect/>
-          </a:stretch>
-        </p:blipFill>
-        <p:spPr>
-          <a:xfrm>
-            <a:off x="4877306" y="2817353"/>
-            <a:ext cx="3021604" cy="1844422"/>
-          </a:xfrm>
-          <a:prstGeom prst="rect">
-            <a:avLst/>
-          </a:prstGeom>
-        </p:spPr>
-      </p:pic>
-      <p:pic>
-        <p:nvPicPr>
-          <p:cNvPr id="13" name="Picture 12" descr="A graph with blue and orange lines&#10;&#10;Description automatically generated">
-            <a:extLst>
-              <a:ext uri="{FF2B5EF4-FFF2-40B4-BE49-F238E27FC236}">
-                <a16:creationId xmlns:a16="http://schemas.microsoft.com/office/drawing/2014/main" id="{8AB8B9A6-B0A1-3353-FC85-01398E93AA83}"/>
-              </a:ext>
-            </a:extLst>
-          </p:cNvPr>
-          <p:cNvPicPr>
-            <a:picLocks noChangeAspect="1"/>
-          </p:cNvPicPr>
-          <p:nvPr/>
-        </p:nvPicPr>
-        <p:blipFill>
-          <a:blip r:embed="rId5"/>
-          <a:stretch>
-            <a:fillRect/>
-          </a:stretch>
-        </p:blipFill>
-        <p:spPr>
-          <a:xfrm>
-            <a:off x="590467" y="715057"/>
-            <a:ext cx="2994901" cy="2142326"/>
-          </a:xfrm>
-          <a:prstGeom prst="rect">
-            <a:avLst/>
-          </a:prstGeom>
-        </p:spPr>
-      </p:pic>
-      <p:pic>
-        <p:nvPicPr>
-          <p:cNvPr id="15" name="Picture 14" descr="A graph with blue and orange lines&#10;&#10;Description automatically generated">
-            <a:extLst>
-              <a:ext uri="{FF2B5EF4-FFF2-40B4-BE49-F238E27FC236}">
-                <a16:creationId xmlns:a16="http://schemas.microsoft.com/office/drawing/2014/main" id="{5BB9DD5D-A4F9-F662-FF40-A40C9457B778}"/>
-              </a:ext>
-            </a:extLst>
-          </p:cNvPr>
-          <p:cNvPicPr>
-            <a:picLocks noChangeAspect="1"/>
-          </p:cNvPicPr>
-          <p:nvPr/>
-        </p:nvPicPr>
-        <p:blipFill>
-          <a:blip r:embed="rId6"/>
-          <a:stretch>
-            <a:fillRect/>
-          </a:stretch>
-        </p:blipFill>
-        <p:spPr>
-          <a:xfrm>
-            <a:off x="4883865" y="715057"/>
-            <a:ext cx="3021604" cy="2094755"/>
-          </a:xfrm>
-          <a:prstGeom prst="rect">
-            <a:avLst/>
-          </a:prstGeom>
-        </p:spPr>
-      </p:pic>
-    </p:spTree>
-    <p:extLst>
-      <p:ext uri="{BB962C8B-B14F-4D97-AF65-F5344CB8AC3E}">
-        <p14:creationId xmlns:p14="http://schemas.microsoft.com/office/powerpoint/2010/main" val="2703077859"/>
       </p:ext>
     </p:extLst>
   </p:cSld>

</xml_diff>